<commit_message>
Third project + etc
</commit_message>
<xml_diff>
--- a/고객 데이터 기반 은행 마케팅 비용 감축 최적 모델 선정/연방준배은행-최종발표.pptx
+++ b/고객 데이터 기반 은행 마케팅 비용 감축 최적 모델 선정/연방준배은행-최종발표.pptx
@@ -25,11 +25,12 @@
     <p:sldId id="273" r:id="rId19"/>
     <p:sldId id="274" r:id="rId20"/>
     <p:sldId id="275" r:id="rId21"/>
-    <p:sldId id="276" r:id="rId22"/>
-    <p:sldId id="277" r:id="rId23"/>
-    <p:sldId id="278" r:id="rId24"/>
+    <p:sldId id="279" r:id="rId22"/>
+    <p:sldId id="276" r:id="rId23"/>
+    <p:sldId id="277" r:id="rId24"/>
+    <p:sldId id="278" r:id="rId25"/>
   </p:sldIdLst>
-  <p:sldSz cx="18288000" cy="10287000" type="screen4x3"/>
+  <p:sldSz cx="18288000" cy="10287000"/>
   <p:notesSz cx="10287000" cy="18288000"/>
   <p:defaultTextStyle>
     <a:defPPr>
@@ -128,7 +129,18 @@
   </p:defaultTextStyle>
   <p:extLst>
     <p:ext uri="{EFAFB233-063F-42B5-8137-9DF3F51BA10A}">
-      <p15:sldGuideLst xmlns:p15="http://schemas.microsoft.com/office/powerpoint/2012/main"/>
+      <p15:sldGuideLst xmlns:p15="http://schemas.microsoft.com/office/powerpoint/2012/main">
+        <p15:guide id="1" orient="horz" pos="2160">
+          <p15:clr>
+            <a:srgbClr val="A4A3A4"/>
+          </p15:clr>
+        </p15:guide>
+        <p15:guide id="2" pos="2880">
+          <p15:clr>
+            <a:srgbClr val="A4A3A4"/>
+          </p15:clr>
+        </p15:guide>
+      </p15:sldGuideLst>
     </p:ext>
   </p:extLst>
 </p:presentation>
@@ -172,10 +184,9 @@
           <a:lstStyle/>
           <a:p>
             <a:r>
-              <a:rPr lang="en-US" smtClean="0"/>
+              <a:rPr lang="en-US"/>
               <a:t>Click to edit Master title style</a:t>
             </a:r>
-            <a:endParaRPr lang="en-US"/>
           </a:p>
         </p:txBody>
       </p:sp>
@@ -291,10 +302,9 @@
           </a:lstStyle>
           <a:p>
             <a:r>
-              <a:rPr lang="en-US" smtClean="0"/>
+              <a:rPr lang="en-US"/>
               <a:t>Click to edit Master subtitle style</a:t>
             </a:r>
-            <a:endParaRPr lang="en-US"/>
           </a:p>
         </p:txBody>
       </p:sp>
@@ -315,7 +325,7 @@
           <a:p>
             <a:fld id="{F8166F1F-CE9B-4651-A6AA-CD717754106B}" type="datetimeFigureOut">
               <a:rPr lang="en-US" smtClean="0"/>
-              <a:t>6/3/2022</a:t>
+              <a:t>9/13/2022</a:t>
             </a:fld>
             <a:endParaRPr lang="en-US"/>
           </a:p>
@@ -404,10 +414,9 @@
           <a:lstStyle/>
           <a:p>
             <a:r>
-              <a:rPr lang="en-US" smtClean="0"/>
+              <a:rPr lang="en-US"/>
               <a:t>Click to edit Master title style</a:t>
             </a:r>
-            <a:endParaRPr lang="en-US"/>
           </a:p>
         </p:txBody>
       </p:sp>
@@ -428,38 +437,37 @@
           <a:p>
             <a:pPr lvl="0"/>
             <a:r>
-              <a:rPr lang="en-US" smtClean="0"/>
+              <a:rPr lang="en-US"/>
               <a:t>Click to edit Master text styles</a:t>
             </a:r>
           </a:p>
           <a:p>
             <a:pPr lvl="1"/>
             <a:r>
-              <a:rPr lang="en-US" smtClean="0"/>
+              <a:rPr lang="en-US"/>
               <a:t>Second level</a:t>
             </a:r>
           </a:p>
           <a:p>
             <a:pPr lvl="2"/>
             <a:r>
-              <a:rPr lang="en-US" smtClean="0"/>
+              <a:rPr lang="en-US"/>
               <a:t>Third level</a:t>
             </a:r>
           </a:p>
           <a:p>
             <a:pPr lvl="3"/>
             <a:r>
-              <a:rPr lang="en-US" smtClean="0"/>
+              <a:rPr lang="en-US"/>
               <a:t>Fourth level</a:t>
             </a:r>
           </a:p>
           <a:p>
             <a:pPr lvl="4"/>
             <a:r>
-              <a:rPr lang="en-US" smtClean="0"/>
+              <a:rPr lang="en-US"/>
               <a:t>Fifth level</a:t>
             </a:r>
-            <a:endParaRPr lang="en-US"/>
           </a:p>
         </p:txBody>
       </p:sp>
@@ -480,7 +488,7 @@
           <a:p>
             <a:fld id="{A76116CE-C4A3-4A05-B2D7-7C2E9A889C0F}" type="datetimeFigureOut">
               <a:rPr lang="en-US" smtClean="0"/>
-              <a:t>1/30/2017</a:t>
+              <a:t>9/13/2022</a:t>
             </a:fld>
             <a:endParaRPr lang="en-US"/>
           </a:p>
@@ -574,10 +582,9 @@
           <a:lstStyle/>
           <a:p>
             <a:r>
-              <a:rPr lang="en-US" smtClean="0"/>
+              <a:rPr lang="en-US"/>
               <a:t>Click to edit Master title style</a:t>
             </a:r>
-            <a:endParaRPr lang="en-US"/>
           </a:p>
         </p:txBody>
       </p:sp>
@@ -603,38 +610,37 @@
           <a:p>
             <a:pPr lvl="0"/>
             <a:r>
-              <a:rPr lang="en-US" smtClean="0"/>
+              <a:rPr lang="en-US"/>
               <a:t>Click to edit Master text styles</a:t>
             </a:r>
           </a:p>
           <a:p>
             <a:pPr lvl="1"/>
             <a:r>
-              <a:rPr lang="en-US" smtClean="0"/>
+              <a:rPr lang="en-US"/>
               <a:t>Second level</a:t>
             </a:r>
           </a:p>
           <a:p>
             <a:pPr lvl="2"/>
             <a:r>
-              <a:rPr lang="en-US" smtClean="0"/>
+              <a:rPr lang="en-US"/>
               <a:t>Third level</a:t>
             </a:r>
           </a:p>
           <a:p>
             <a:pPr lvl="3"/>
             <a:r>
-              <a:rPr lang="en-US" smtClean="0"/>
+              <a:rPr lang="en-US"/>
               <a:t>Fourth level</a:t>
             </a:r>
           </a:p>
           <a:p>
             <a:pPr lvl="4"/>
             <a:r>
-              <a:rPr lang="en-US" smtClean="0"/>
+              <a:rPr lang="en-US"/>
               <a:t>Fifth level</a:t>
             </a:r>
-            <a:endParaRPr lang="en-US"/>
           </a:p>
         </p:txBody>
       </p:sp>
@@ -655,7 +661,7 @@
           <a:p>
             <a:fld id="{A76116CE-C4A3-4A05-B2D7-7C2E9A889C0F}" type="datetimeFigureOut">
               <a:rPr lang="en-US" smtClean="0"/>
-              <a:t>1/30/2017</a:t>
+              <a:t>9/13/2022</a:t>
             </a:fld>
             <a:endParaRPr lang="en-US"/>
           </a:p>
@@ -744,10 +750,9 @@
           <a:lstStyle/>
           <a:p>
             <a:r>
-              <a:rPr lang="en-US" smtClean="0"/>
+              <a:rPr lang="en-US"/>
               <a:t>Click to edit Master title style</a:t>
             </a:r>
-            <a:endParaRPr lang="en-US"/>
           </a:p>
         </p:txBody>
       </p:sp>
@@ -770,38 +775,37 @@
               <a:buChar char="•"/>
             </a:pPr>
             <a:r>
-              <a:rPr lang="en-US" smtClean="0"/>
+              <a:rPr lang="en-US"/>
               <a:t>Click to edit Master text styles</a:t>
             </a:r>
           </a:p>
           <a:p>
             <a:pPr lvl="1"/>
             <a:r>
-              <a:rPr lang="en-US" smtClean="0"/>
+              <a:rPr lang="en-US"/>
               <a:t>Second level</a:t>
             </a:r>
           </a:p>
           <a:p>
             <a:pPr lvl="2"/>
             <a:r>
-              <a:rPr lang="en-US" smtClean="0"/>
+              <a:rPr lang="en-US"/>
               <a:t>Third level</a:t>
             </a:r>
           </a:p>
           <a:p>
             <a:pPr lvl="3"/>
             <a:r>
-              <a:rPr lang="en-US" smtClean="0"/>
+              <a:rPr lang="en-US"/>
               <a:t>Fourth level</a:t>
             </a:r>
           </a:p>
           <a:p>
             <a:pPr lvl="4"/>
             <a:r>
-              <a:rPr lang="en-US" smtClean="0"/>
+              <a:rPr lang="en-US"/>
               <a:t>Fifth level</a:t>
             </a:r>
-            <a:endParaRPr lang="en-US"/>
           </a:p>
         </p:txBody>
       </p:sp>
@@ -822,7 +826,7 @@
           <a:p>
             <a:fld id="{A76116CE-C4A3-4A05-B2D7-7C2E9A889C0F}" type="datetimeFigureOut">
               <a:rPr lang="en-US" smtClean="0"/>
-              <a:t>6/3/2022</a:t>
+              <a:t>9/13/2022</a:t>
             </a:fld>
             <a:endParaRPr lang="en-US"/>
           </a:p>
@@ -920,10 +924,9 @@
           </a:lstStyle>
           <a:p>
             <a:r>
-              <a:rPr lang="en-US" smtClean="0"/>
+              <a:rPr lang="en-US"/>
               <a:t>Click to edit Master title style</a:t>
             </a:r>
-            <a:endParaRPr lang="en-US"/>
           </a:p>
         </p:txBody>
       </p:sp>
@@ -1040,7 +1043,7 @@
           <a:p>
             <a:pPr lvl="0"/>
             <a:r>
-              <a:rPr lang="en-US" smtClean="0"/>
+              <a:rPr lang="en-US"/>
               <a:t>Click to edit Master text styles</a:t>
             </a:r>
           </a:p>
@@ -1063,7 +1066,7 @@
           <a:p>
             <a:fld id="{A76116CE-C4A3-4A05-B2D7-7C2E9A889C0F}" type="datetimeFigureOut">
               <a:rPr lang="en-US" smtClean="0"/>
-              <a:t>6/3/2022</a:t>
+              <a:t>9/13/2022</a:t>
             </a:fld>
             <a:endParaRPr lang="en-US"/>
           </a:p>
@@ -1152,10 +1155,9 @@
           <a:lstStyle/>
           <a:p>
             <a:r>
-              <a:rPr lang="en-US" smtClean="0"/>
+              <a:rPr lang="en-US"/>
               <a:t>Click to edit Master title style</a:t>
             </a:r>
-            <a:endParaRPr lang="en-US"/>
           </a:p>
         </p:txBody>
       </p:sp>
@@ -1209,38 +1211,37 @@
           <a:p>
             <a:pPr lvl="0"/>
             <a:r>
-              <a:rPr lang="en-US" smtClean="0"/>
+              <a:rPr lang="en-US"/>
               <a:t>Click to edit Master text styles</a:t>
             </a:r>
           </a:p>
           <a:p>
             <a:pPr lvl="1"/>
             <a:r>
-              <a:rPr lang="en-US" smtClean="0"/>
+              <a:rPr lang="en-US"/>
               <a:t>Second level</a:t>
             </a:r>
           </a:p>
           <a:p>
             <a:pPr lvl="2"/>
             <a:r>
-              <a:rPr lang="en-US" smtClean="0"/>
+              <a:rPr lang="en-US"/>
               <a:t>Third level</a:t>
             </a:r>
           </a:p>
           <a:p>
             <a:pPr lvl="3"/>
             <a:r>
-              <a:rPr lang="en-US" smtClean="0"/>
+              <a:rPr lang="en-US"/>
               <a:t>Fourth level</a:t>
             </a:r>
           </a:p>
           <a:p>
             <a:pPr lvl="4"/>
             <a:r>
-              <a:rPr lang="en-US" smtClean="0"/>
+              <a:rPr lang="en-US"/>
               <a:t>Fifth level</a:t>
             </a:r>
-            <a:endParaRPr lang="en-US"/>
           </a:p>
         </p:txBody>
       </p:sp>
@@ -1294,38 +1295,37 @@
           <a:p>
             <a:pPr lvl="0"/>
             <a:r>
-              <a:rPr lang="en-US" smtClean="0"/>
+              <a:rPr lang="en-US"/>
               <a:t>Click to edit Master text styles</a:t>
             </a:r>
           </a:p>
           <a:p>
             <a:pPr lvl="1"/>
             <a:r>
-              <a:rPr lang="en-US" smtClean="0"/>
+              <a:rPr lang="en-US"/>
               <a:t>Second level</a:t>
             </a:r>
           </a:p>
           <a:p>
             <a:pPr lvl="2"/>
             <a:r>
-              <a:rPr lang="en-US" smtClean="0"/>
+              <a:rPr lang="en-US"/>
               <a:t>Third level</a:t>
             </a:r>
           </a:p>
           <a:p>
             <a:pPr lvl="3"/>
             <a:r>
-              <a:rPr lang="en-US" smtClean="0"/>
+              <a:rPr lang="en-US"/>
               <a:t>Fourth level</a:t>
             </a:r>
           </a:p>
           <a:p>
             <a:pPr lvl="4"/>
             <a:r>
-              <a:rPr lang="en-US" smtClean="0"/>
+              <a:rPr lang="en-US"/>
               <a:t>Fifth level</a:t>
             </a:r>
-            <a:endParaRPr lang="en-US"/>
           </a:p>
         </p:txBody>
       </p:sp>
@@ -1346,7 +1346,7 @@
           <a:p>
             <a:fld id="{A76116CE-C4A3-4A05-B2D7-7C2E9A889C0F}" type="datetimeFigureOut">
               <a:rPr lang="en-US" smtClean="0"/>
-              <a:t>1/30/2017</a:t>
+              <a:t>9/13/2022</a:t>
             </a:fld>
             <a:endParaRPr lang="en-US"/>
           </a:p>
@@ -1439,10 +1439,9 @@
           </a:lstStyle>
           <a:p>
             <a:r>
-              <a:rPr lang="en-US" smtClean="0"/>
+              <a:rPr lang="en-US"/>
               <a:t>Click to edit Master title style</a:t>
             </a:r>
-            <a:endParaRPr lang="en-US"/>
           </a:p>
         </p:txBody>
       </p:sp>
@@ -1505,7 +1504,7 @@
           <a:p>
             <a:pPr lvl="0"/>
             <a:r>
-              <a:rPr lang="en-US" smtClean="0"/>
+              <a:rPr lang="en-US"/>
               <a:t>Click to edit Master text styles</a:t>
             </a:r>
           </a:p>
@@ -1561,38 +1560,37 @@
           <a:p>
             <a:pPr lvl="0"/>
             <a:r>
-              <a:rPr lang="en-US" smtClean="0"/>
+              <a:rPr lang="en-US"/>
               <a:t>Click to edit Master text styles</a:t>
             </a:r>
           </a:p>
           <a:p>
             <a:pPr lvl="1"/>
             <a:r>
-              <a:rPr lang="en-US" smtClean="0"/>
+              <a:rPr lang="en-US"/>
               <a:t>Second level</a:t>
             </a:r>
           </a:p>
           <a:p>
             <a:pPr lvl="2"/>
             <a:r>
-              <a:rPr lang="en-US" smtClean="0"/>
+              <a:rPr lang="en-US"/>
               <a:t>Third level</a:t>
             </a:r>
           </a:p>
           <a:p>
             <a:pPr lvl="3"/>
             <a:r>
-              <a:rPr lang="en-US" smtClean="0"/>
+              <a:rPr lang="en-US"/>
               <a:t>Fourth level</a:t>
             </a:r>
           </a:p>
           <a:p>
             <a:pPr lvl="4"/>
             <a:r>
-              <a:rPr lang="en-US" smtClean="0"/>
+              <a:rPr lang="en-US"/>
               <a:t>Fifth level</a:t>
             </a:r>
-            <a:endParaRPr lang="en-US"/>
           </a:p>
         </p:txBody>
       </p:sp>
@@ -1655,7 +1653,7 @@
           <a:p>
             <a:pPr lvl="0"/>
             <a:r>
-              <a:rPr lang="en-US" smtClean="0"/>
+              <a:rPr lang="en-US"/>
               <a:t>Click to edit Master text styles</a:t>
             </a:r>
           </a:p>
@@ -1711,38 +1709,37 @@
           <a:p>
             <a:pPr lvl="0"/>
             <a:r>
-              <a:rPr lang="en-US" smtClean="0"/>
+              <a:rPr lang="en-US"/>
               <a:t>Click to edit Master text styles</a:t>
             </a:r>
           </a:p>
           <a:p>
             <a:pPr lvl="1"/>
             <a:r>
-              <a:rPr lang="en-US" smtClean="0"/>
+              <a:rPr lang="en-US"/>
               <a:t>Second level</a:t>
             </a:r>
           </a:p>
           <a:p>
             <a:pPr lvl="2"/>
             <a:r>
-              <a:rPr lang="en-US" smtClean="0"/>
+              <a:rPr lang="en-US"/>
               <a:t>Third level</a:t>
             </a:r>
           </a:p>
           <a:p>
             <a:pPr lvl="3"/>
             <a:r>
-              <a:rPr lang="en-US" smtClean="0"/>
+              <a:rPr lang="en-US"/>
               <a:t>Fourth level</a:t>
             </a:r>
           </a:p>
           <a:p>
             <a:pPr lvl="4"/>
             <a:r>
-              <a:rPr lang="en-US" smtClean="0"/>
+              <a:rPr lang="en-US"/>
               <a:t>Fifth level</a:t>
             </a:r>
-            <a:endParaRPr lang="en-US"/>
           </a:p>
         </p:txBody>
       </p:sp>
@@ -1763,7 +1760,7 @@
           <a:p>
             <a:fld id="{A76116CE-C4A3-4A05-B2D7-7C2E9A889C0F}" type="datetimeFigureOut">
               <a:rPr lang="en-US" smtClean="0"/>
-              <a:t>1/30/2017</a:t>
+              <a:t>9/13/2022</a:t>
             </a:fld>
             <a:endParaRPr lang="en-US"/>
           </a:p>
@@ -1852,10 +1849,9 @@
           <a:lstStyle/>
           <a:p>
             <a:r>
-              <a:rPr lang="en-US" smtClean="0"/>
+              <a:rPr lang="en-US"/>
               <a:t>Click to edit Master title style</a:t>
             </a:r>
-            <a:endParaRPr lang="en-US"/>
           </a:p>
         </p:txBody>
       </p:sp>
@@ -1876,7 +1872,7 @@
           <a:p>
             <a:fld id="{A76116CE-C4A3-4A05-B2D7-7C2E9A889C0F}" type="datetimeFigureOut">
               <a:rPr lang="en-US" smtClean="0"/>
-              <a:t>1/30/2017</a:t>
+              <a:t>9/13/2022</a:t>
             </a:fld>
             <a:endParaRPr lang="en-US"/>
           </a:p>
@@ -1966,7 +1962,7 @@
           <a:p>
             <a:fld id="{A76116CE-C4A3-4A05-B2D7-7C2E9A889C0F}" type="datetimeFigureOut">
               <a:rPr lang="en-US" smtClean="0"/>
-              <a:t>1/30/2017</a:t>
+              <a:t>9/13/2022</a:t>
             </a:fld>
             <a:endParaRPr lang="en-US"/>
           </a:p>
@@ -2064,10 +2060,9 @@
           </a:lstStyle>
           <a:p>
             <a:r>
-              <a:rPr lang="en-US" smtClean="0"/>
+              <a:rPr lang="en-US"/>
               <a:t>Click to edit Master title style</a:t>
             </a:r>
-            <a:endParaRPr lang="en-US"/>
           </a:p>
         </p:txBody>
       </p:sp>
@@ -2121,38 +2116,37 @@
           <a:p>
             <a:pPr lvl="0"/>
             <a:r>
-              <a:rPr lang="en-US" smtClean="0"/>
+              <a:rPr lang="en-US"/>
               <a:t>Click to edit Master text styles</a:t>
             </a:r>
           </a:p>
           <a:p>
             <a:pPr lvl="1"/>
             <a:r>
-              <a:rPr lang="en-US" smtClean="0"/>
+              <a:rPr lang="en-US"/>
               <a:t>Second level</a:t>
             </a:r>
           </a:p>
           <a:p>
             <a:pPr lvl="2"/>
             <a:r>
-              <a:rPr lang="en-US" smtClean="0"/>
+              <a:rPr lang="en-US"/>
               <a:t>Third level</a:t>
             </a:r>
           </a:p>
           <a:p>
             <a:pPr lvl="3"/>
             <a:r>
-              <a:rPr lang="en-US" smtClean="0"/>
+              <a:rPr lang="en-US"/>
               <a:t>Fourth level</a:t>
             </a:r>
           </a:p>
           <a:p>
             <a:pPr lvl="4"/>
             <a:r>
-              <a:rPr lang="en-US" smtClean="0"/>
+              <a:rPr lang="en-US"/>
               <a:t>Fifth level</a:t>
             </a:r>
-            <a:endParaRPr lang="en-US"/>
           </a:p>
         </p:txBody>
       </p:sp>
@@ -2215,7 +2209,7 @@
           <a:p>
             <a:pPr lvl="0"/>
             <a:r>
-              <a:rPr lang="en-US" smtClean="0"/>
+              <a:rPr lang="en-US"/>
               <a:t>Click to edit Master text styles</a:t>
             </a:r>
           </a:p>
@@ -2238,7 +2232,7 @@
           <a:p>
             <a:fld id="{A76116CE-C4A3-4A05-B2D7-7C2E9A889C0F}" type="datetimeFigureOut">
               <a:rPr lang="en-US" smtClean="0"/>
-              <a:t>1/30/2017</a:t>
+              <a:t>9/13/2022</a:t>
             </a:fld>
             <a:endParaRPr lang="en-US"/>
           </a:p>
@@ -2336,10 +2330,9 @@
           </a:lstStyle>
           <a:p>
             <a:r>
-              <a:rPr lang="en-US" smtClean="0"/>
+              <a:rPr lang="en-US"/>
               <a:t>Click to edit Master title style</a:t>
             </a:r>
-            <a:endParaRPr lang="en-US"/>
           </a:p>
         </p:txBody>
       </p:sp>
@@ -2463,7 +2456,7 @@
           <a:p>
             <a:pPr lvl="0"/>
             <a:r>
-              <a:rPr lang="en-US" smtClean="0"/>
+              <a:rPr lang="en-US"/>
               <a:t>Click to edit Master text styles</a:t>
             </a:r>
           </a:p>
@@ -2486,7 +2479,7 @@
           <a:p>
             <a:fld id="{A76116CE-C4A3-4A05-B2D7-7C2E9A889C0F}" type="datetimeFigureOut">
               <a:rPr lang="en-US" smtClean="0"/>
-              <a:t>1/30/2017</a:t>
+              <a:t>9/13/2022</a:t>
             </a:fld>
             <a:endParaRPr lang="en-US"/>
           </a:p>
@@ -2590,10 +2583,9 @@
           <a:lstStyle/>
           <a:p>
             <a:r>
-              <a:rPr lang="en-US" smtClean="0"/>
+              <a:rPr lang="en-US"/>
               <a:t>Click to edit Master title style</a:t>
             </a:r>
-            <a:endParaRPr lang="en-US"/>
           </a:p>
         </p:txBody>
       </p:sp>
@@ -2624,38 +2616,37 @@
           <a:p>
             <a:pPr lvl="0"/>
             <a:r>
-              <a:rPr lang="en-US" smtClean="0"/>
+              <a:rPr lang="en-US"/>
               <a:t>Click to edit Master text styles</a:t>
             </a:r>
           </a:p>
           <a:p>
             <a:pPr lvl="1"/>
             <a:r>
-              <a:rPr lang="en-US" smtClean="0"/>
+              <a:rPr lang="en-US"/>
               <a:t>Second level</a:t>
             </a:r>
           </a:p>
           <a:p>
             <a:pPr lvl="2"/>
             <a:r>
-              <a:rPr lang="en-US" smtClean="0"/>
+              <a:rPr lang="en-US"/>
               <a:t>Third level</a:t>
             </a:r>
           </a:p>
           <a:p>
             <a:pPr lvl="3"/>
             <a:r>
-              <a:rPr lang="en-US" smtClean="0"/>
+              <a:rPr lang="en-US"/>
               <a:t>Fourth level</a:t>
             </a:r>
           </a:p>
           <a:p>
             <a:pPr lvl="4"/>
             <a:r>
-              <a:rPr lang="en-US" smtClean="0"/>
+              <a:rPr lang="en-US"/>
               <a:t>Fifth level</a:t>
             </a:r>
-            <a:endParaRPr lang="en-US"/>
           </a:p>
         </p:txBody>
       </p:sp>
@@ -2694,7 +2685,7 @@
           <a:p>
             <a:fld id="{F8166F1F-CE9B-4651-A6AA-CD717754106B}" type="datetimeFigureOut">
               <a:rPr lang="en-US" smtClean="0"/>
-              <a:t>6/13/2013</a:t>
+              <a:t>9/13/2022</a:t>
             </a:fld>
             <a:endParaRPr lang="en-US"/>
           </a:p>
@@ -2772,7 +2763,7 @@
           <a:p>
             <a:fld id="{F7021451-1387-4CA6-816F-3879F97B5CBC}" type="slidenum">
               <a:rPr lang="en-US" smtClean="0"/>
-              <a:t>�#�</a:t>
+              <a:t>‹#›</a:t>
             </a:fld>
             <a:endParaRPr lang="en-US"/>
           </a:p>
@@ -2783,16 +2774,16 @@
   <p:clrMap bg1="lt1" tx1="dk1" bg2="lt2" tx2="dk2" accent1="accent1" accent2="accent2" accent3="accent3" accent4="accent4" accent5="accent5" accent6="accent6" hlink="hlink" folHlink="folHlink"/>
   <p:sldLayoutIdLst>
     <p:sldLayoutId id="2147483649" r:id="rId1"/>
-    <p:sldLayoutId id="2147483650" r:id="rId3"/>
-    <p:sldLayoutId id="2147483651" r:id="rId4"/>
-    <p:sldLayoutId id="2147483652" r:id="rId5"/>
-    <p:sldLayoutId id="2147483653" r:id="rId6"/>
-    <p:sldLayoutId id="2147483654" r:id="rId7"/>
-    <p:sldLayoutId id="2147483655" r:id="rId8"/>
-    <p:sldLayoutId id="2147483656" r:id="rId9"/>
-    <p:sldLayoutId id="2147483657" r:id="rId10"/>
-    <p:sldLayoutId id="2147483658" r:id="rId11"/>
-    <p:sldLayoutId id="2147483659" r:id="rId12"/>
+    <p:sldLayoutId id="2147483650" r:id="rId2"/>
+    <p:sldLayoutId id="2147483651" r:id="rId3"/>
+    <p:sldLayoutId id="2147483652" r:id="rId4"/>
+    <p:sldLayoutId id="2147483653" r:id="rId5"/>
+    <p:sldLayoutId id="2147483654" r:id="rId6"/>
+    <p:sldLayoutId id="2147483655" r:id="rId7"/>
+    <p:sldLayoutId id="2147483656" r:id="rId8"/>
+    <p:sldLayoutId id="2147483657" r:id="rId9"/>
+    <p:sldLayoutId id="2147483658" r:id="rId10"/>
+    <p:sldLayoutId id="2147483659" r:id="rId11"/>
   </p:sldLayoutIdLst>
   <p:txStyles>
     <p:titleStyle>
@@ -5579,7 +5570,7 @@
             <p:nvPr/>
           </p:nvPicPr>
           <p:blipFill>
-            <a:blip r:embed="rId12" cstate="print"/>
+            <a:blip r:embed="rId10" cstate="print"/>
             <a:stretch>
               <a:fillRect/>
             </a:stretch>
@@ -5618,7 +5609,7 @@
             <p:nvPr/>
           </p:nvPicPr>
           <p:blipFill>
-            <a:blip r:embed="rId13" cstate="print"/>
+            <a:blip r:embed="rId10" cstate="print"/>
             <a:stretch>
               <a:fillRect/>
             </a:stretch>
@@ -5657,7 +5648,7 @@
             <p:nvPr/>
           </p:nvPicPr>
           <p:blipFill>
-            <a:blip r:embed="rId14" cstate="print"/>
+            <a:blip r:embed="rId10" cstate="print"/>
             <a:stretch>
               <a:fillRect/>
             </a:stretch>
@@ -5682,7 +5673,7 @@
           <p:nvPr/>
         </p:nvPicPr>
         <p:blipFill>
-          <a:blip r:embed="rId15" cstate="print"/>
+          <a:blip r:embed="rId12" cstate="print"/>
           <a:stretch>
             <a:fillRect/>
           </a:stretch>
@@ -5706,7 +5697,7 @@
           <p:nvPr/>
         </p:nvPicPr>
         <p:blipFill>
-          <a:blip r:embed="rId16" cstate="print"/>
+          <a:blip r:embed="rId13" cstate="print"/>
           <a:stretch>
             <a:fillRect/>
           </a:stretch>
@@ -7073,7 +7064,7 @@
             <p:nvPr/>
           </p:nvPicPr>
           <p:blipFill>
-            <a:blip r:embed="rId14" cstate="print"/>
+            <a:blip r:embed="rId10" cstate="print"/>
             <a:stretch>
               <a:fillRect/>
             </a:stretch>
@@ -7112,7 +7103,7 @@
             <p:nvPr/>
           </p:nvPicPr>
           <p:blipFill>
-            <a:blip r:embed="rId15" cstate="print"/>
+            <a:blip r:embed="rId14" cstate="print"/>
             <a:stretch>
               <a:fillRect/>
             </a:stretch>
@@ -7137,7 +7128,7 @@
           <p:nvPr/>
         </p:nvPicPr>
         <p:blipFill>
-          <a:blip r:embed="rId16" cstate="print"/>
+          <a:blip r:embed="rId15" cstate="print"/>
           <a:stretch>
             <a:fillRect/>
           </a:stretch>
@@ -7943,7 +7934,7 @@
             <p:nvPr/>
           </p:nvPicPr>
           <p:blipFill>
-            <a:blip r:embed="rId15" cstate="print"/>
+            <a:blip r:embed="rId14" cstate="print"/>
             <a:stretch>
               <a:fillRect/>
             </a:stretch>
@@ -7968,7 +7959,7 @@
           <p:nvPr/>
         </p:nvPicPr>
         <p:blipFill>
-          <a:blip r:embed="rId16" cstate="print"/>
+          <a:blip r:embed="rId15" cstate="print"/>
           <a:stretch>
             <a:fillRect/>
           </a:stretch>
@@ -7992,7 +7983,7 @@
           <p:nvPr/>
         </p:nvPicPr>
         <p:blipFill>
-          <a:blip r:embed="rId17" cstate="print"/>
+          <a:blip r:embed="rId16" cstate="print"/>
           <a:stretch>
             <a:fillRect/>
           </a:stretch>
@@ -8030,7 +8021,7 @@
             <p:nvPr/>
           </p:nvPicPr>
           <p:blipFill>
-            <a:blip r:embed="rId18" cstate="print"/>
+            <a:blip r:embed="rId17" cstate="print"/>
             <a:stretch>
               <a:fillRect/>
             </a:stretch>
@@ -8456,7 +8447,7 @@
             <p:nvPr/>
           </p:nvPicPr>
           <p:blipFill>
-            <a:blip r:embed="rId13" cstate="print"/>
+            <a:blip r:embed="rId12" cstate="print"/>
             <a:stretch>
               <a:fillRect/>
             </a:stretch>
@@ -8481,7 +8472,7 @@
           <p:nvPr/>
         </p:nvPicPr>
         <p:blipFill>
-          <a:blip r:embed="rId14" cstate="print"/>
+          <a:blip r:embed="rId13" cstate="print"/>
           <a:stretch>
             <a:fillRect/>
           </a:stretch>
@@ -8505,7 +8496,7 @@
           <p:nvPr/>
         </p:nvPicPr>
         <p:blipFill>
-          <a:blip r:embed="rId15" cstate="print"/>
+          <a:blip r:embed="rId14" cstate="print"/>
           <a:stretch>
             <a:fillRect/>
           </a:stretch>
@@ -9045,30 +9036,6 @@
           </p:spPr>
         </p:pic>
       </p:grpSp>
-      <p:pic>
-        <p:nvPicPr>
-          <p:cNvPr id="15" name="Object 14"/>
-          <p:cNvPicPr>
-            <a:picLocks noChangeAspect="1"/>
-          </p:cNvPicPr>
-          <p:nvPr/>
-        </p:nvPicPr>
-        <p:blipFill>
-          <a:blip r:embed="rId9" cstate="print"/>
-          <a:stretch>
-            <a:fillRect/>
-          </a:stretch>
-        </p:blipFill>
-        <p:spPr>
-          <a:xfrm>
-            <a:off x="3474611" y="6857127"/>
-            <a:ext cx="11405612" cy="1571784"/>
-          </a:xfrm>
-          <a:prstGeom prst="rect">
-            <a:avLst/>
-          </a:prstGeom>
-        </p:spPr>
-      </p:pic>
       <p:grpSp>
         <p:nvGrpSpPr>
           <p:cNvPr id="1004" name="그룹 1004"/>
@@ -9092,7 +9059,7 @@
             <p:nvPr/>
           </p:nvPicPr>
           <p:blipFill>
-            <a:blip r:embed="rId10" cstate="print"/>
+            <a:blip r:embed="rId9" cstate="print"/>
             <a:stretch>
               <a:fillRect/>
             </a:stretch>
@@ -9116,7 +9083,7 @@
         </p:nvGrpSpPr>
         <p:grpSpPr>
           <a:xfrm>
-            <a:off x="1267528" y="6647619"/>
+            <a:off x="1272290" y="7277100"/>
             <a:ext cx="2060716" cy="1966902"/>
             <a:chOff x="1267528" y="6647619"/>
             <a:chExt cx="2060716" cy="1966902"/>
@@ -9131,7 +9098,7 @@
             <p:nvPr/>
           </p:nvPicPr>
           <p:blipFill>
-            <a:blip r:embed="rId11" cstate="print"/>
+            <a:blip r:embed="rId9" cstate="print"/>
             <a:stretch>
               <a:fillRect/>
             </a:stretch>
@@ -9147,6 +9114,369 @@
           </p:spPr>
         </p:pic>
       </p:grpSp>
+      <p:sp>
+        <p:nvSpPr>
+          <p:cNvPr id="11" name="TextBox 10">
+            <a:extLst>
+              <a:ext uri="{FF2B5EF4-FFF2-40B4-BE49-F238E27FC236}">
+                <a16:creationId xmlns:a16="http://schemas.microsoft.com/office/drawing/2014/main" id="{E64A52B7-CE68-EE95-9596-C58565C4A266}"/>
+              </a:ext>
+            </a:extLst>
+          </p:cNvPr>
+          <p:cNvSpPr txBox="1"/>
+          <p:nvPr/>
+        </p:nvSpPr>
+        <p:spPr>
+          <a:xfrm>
+            <a:off x="3416898" y="7557484"/>
+            <a:ext cx="13423302" cy="1938992"/>
+          </a:xfrm>
+          <a:prstGeom prst="rect">
+            <a:avLst/>
+          </a:prstGeom>
+          <a:noFill/>
+        </p:spPr>
+        <p:txBody>
+          <a:bodyPr wrap="square" rtlCol="0">
+            <a:spAutoFit/>
+          </a:bodyPr>
+          <a:lstStyle/>
+          <a:p>
+            <a:r>
+              <a:rPr lang="ko-KR" altLang="en-US" sz="3000" b="1" dirty="0"/>
+              <a:t>기존 </a:t>
+            </a:r>
+            <a:endParaRPr lang="en-US" altLang="ko-KR" sz="3000" b="1" dirty="0"/>
+          </a:p>
+          <a:p>
+            <a:r>
+              <a:rPr lang="ko-KR" altLang="en-US" sz="3000" b="1" dirty="0"/>
+              <a:t>마케팅 대상</a:t>
+            </a:r>
+            <a:r>
+              <a:rPr lang="en-US" altLang="ko-KR" sz="3000" b="1" dirty="0"/>
+              <a:t>: 41188</a:t>
+            </a:r>
+            <a:r>
+              <a:rPr lang="ko-KR" altLang="en-US" sz="3000" b="1" dirty="0"/>
+              <a:t>명</a:t>
+            </a:r>
+            <a:r>
+              <a:rPr lang="en-US" altLang="ko-KR" sz="3000" b="1" dirty="0"/>
+              <a:t>   -&gt; </a:t>
+            </a:r>
+            <a:r>
+              <a:rPr lang="ko-KR" altLang="en-US" sz="3000" b="1" dirty="0"/>
+              <a:t>마케팅 성공</a:t>
+            </a:r>
+            <a:r>
+              <a:rPr lang="en-US" altLang="ko-KR" sz="3000" b="1" dirty="0"/>
+              <a:t>: 4640</a:t>
+            </a:r>
+            <a:r>
+              <a:rPr lang="ko-KR" altLang="en-US" sz="3000" b="1" dirty="0"/>
+              <a:t>명 </a:t>
+            </a:r>
+            <a:endParaRPr lang="en-US" altLang="ko-KR" sz="3000" b="1" dirty="0"/>
+          </a:p>
+          <a:p>
+            <a:r>
+              <a:rPr lang="ko-KR" altLang="en-US" sz="3000" b="1" dirty="0"/>
+              <a:t>모델 결과</a:t>
+            </a:r>
+            <a:endParaRPr lang="en-US" altLang="ko-KR" sz="3000" b="1" dirty="0"/>
+          </a:p>
+          <a:p>
+            <a:r>
+              <a:rPr lang="ko-KR" altLang="en-US" sz="3000" b="1" dirty="0"/>
+              <a:t>마케팅 대상</a:t>
+            </a:r>
+            <a:r>
+              <a:rPr lang="en-US" altLang="ko-KR" sz="3000" b="1" dirty="0"/>
+              <a:t>: 422</a:t>
+            </a:r>
+            <a:r>
+              <a:rPr lang="ko-KR" altLang="en-US" sz="3000" b="1" dirty="0"/>
+              <a:t>명 </a:t>
+            </a:r>
+            <a:r>
+              <a:rPr lang="en-US" altLang="ko-KR" sz="3000" b="1" dirty="0"/>
+              <a:t>-&gt; </a:t>
+            </a:r>
+            <a:r>
+              <a:rPr lang="ko-KR" altLang="en-US" sz="3000" b="1" dirty="0"/>
+              <a:t>마케팅 성공</a:t>
+            </a:r>
+            <a:r>
+              <a:rPr lang="en-US" altLang="ko-KR" sz="3000" b="1" dirty="0"/>
+              <a:t>: 272</a:t>
+            </a:r>
+            <a:r>
+              <a:rPr lang="ko-KR" altLang="en-US" sz="3000" b="1" dirty="0"/>
+              <a:t>명</a:t>
+            </a:r>
+          </a:p>
+        </p:txBody>
+      </p:sp>
+      <p:sp>
+        <p:nvSpPr>
+          <p:cNvPr id="12" name="TextBox 11">
+            <a:extLst>
+              <a:ext uri="{FF2B5EF4-FFF2-40B4-BE49-F238E27FC236}">
+                <a16:creationId xmlns:a16="http://schemas.microsoft.com/office/drawing/2014/main" id="{8C6F8757-A40D-71D8-734C-8EA3A3503F06}"/>
+              </a:ext>
+            </a:extLst>
+          </p:cNvPr>
+          <p:cNvSpPr txBox="1"/>
+          <p:nvPr/>
+        </p:nvSpPr>
+        <p:spPr>
+          <a:xfrm>
+            <a:off x="3304431" y="5195780"/>
+            <a:ext cx="2126670" cy="553998"/>
+          </a:xfrm>
+          <a:prstGeom prst="rect">
+            <a:avLst/>
+          </a:prstGeom>
+          <a:noFill/>
+        </p:spPr>
+        <p:txBody>
+          <a:bodyPr wrap="square" rtlCol="0">
+            <a:spAutoFit/>
+          </a:bodyPr>
+          <a:lstStyle/>
+          <a:p>
+            <a:r>
+              <a:rPr lang="ko-KR" altLang="en-US" sz="3000" b="1" dirty="0"/>
+              <a:t>모델 성능</a:t>
+            </a:r>
+            <a:r>
+              <a:rPr lang="en-US" altLang="ko-KR" sz="3000" b="1" dirty="0"/>
+              <a:t>: </a:t>
+            </a:r>
+            <a:endParaRPr lang="ko-KR" altLang="en-US" sz="3000" b="1" dirty="0"/>
+          </a:p>
+        </p:txBody>
+      </p:sp>
+      <p:graphicFrame>
+        <p:nvGraphicFramePr>
+          <p:cNvPr id="14" name="표 15">
+            <a:extLst>
+              <a:ext uri="{FF2B5EF4-FFF2-40B4-BE49-F238E27FC236}">
+                <a16:creationId xmlns:a16="http://schemas.microsoft.com/office/drawing/2014/main" id="{8E68E5B5-EABC-F4F0-828C-CEAD00E35A03}"/>
+              </a:ext>
+            </a:extLst>
+          </p:cNvPr>
+          <p:cNvGraphicFramePr>
+            <a:graphicFrameLocks noGrp="1"/>
+          </p:cNvGraphicFramePr>
+          <p:nvPr>
+            <p:extLst>
+              <p:ext uri="{D42A27DB-BD31-4B8C-83A1-F6EECF244321}">
+                <p14:modId xmlns:p14="http://schemas.microsoft.com/office/powerpoint/2010/main" val="1420742855"/>
+              </p:ext>
+            </p:extLst>
+          </p:nvPr>
+        </p:nvGraphicFramePr>
+        <p:xfrm>
+          <a:off x="5254437" y="5127419"/>
+          <a:ext cx="12192000" cy="1767840"/>
+        </p:xfrm>
+        <a:graphic>
+          <a:graphicData uri="http://schemas.openxmlformats.org/drawingml/2006/table">
+            <a:tbl>
+              <a:tblPr firstRow="1" bandRow="1">
+                <a:tableStyleId>{5C22544A-7EE6-4342-B048-85BDC9FD1C3A}</a:tableStyleId>
+              </a:tblPr>
+              <a:tblGrid>
+                <a:gridCol w="3048000">
+                  <a:extLst>
+                    <a:ext uri="{9D8B030D-6E8A-4147-A177-3AD203B41FA5}">
+                      <a16:colId xmlns:a16="http://schemas.microsoft.com/office/drawing/2014/main" val="3128705864"/>
+                    </a:ext>
+                  </a:extLst>
+                </a:gridCol>
+                <a:gridCol w="3048000">
+                  <a:extLst>
+                    <a:ext uri="{9D8B030D-6E8A-4147-A177-3AD203B41FA5}">
+                      <a16:colId xmlns:a16="http://schemas.microsoft.com/office/drawing/2014/main" val="2744421528"/>
+                    </a:ext>
+                  </a:extLst>
+                </a:gridCol>
+                <a:gridCol w="3048000">
+                  <a:extLst>
+                    <a:ext uri="{9D8B030D-6E8A-4147-A177-3AD203B41FA5}">
+                      <a16:colId xmlns:a16="http://schemas.microsoft.com/office/drawing/2014/main" val="4154933172"/>
+                    </a:ext>
+                  </a:extLst>
+                </a:gridCol>
+                <a:gridCol w="3048000">
+                  <a:extLst>
+                    <a:ext uri="{9D8B030D-6E8A-4147-A177-3AD203B41FA5}">
+                      <a16:colId xmlns:a16="http://schemas.microsoft.com/office/drawing/2014/main" val="3567083736"/>
+                    </a:ext>
+                  </a:extLst>
+                </a:gridCol>
+              </a:tblGrid>
+              <a:tr h="787400">
+                <a:tc>
+                  <a:txBody>
+                    <a:bodyPr/>
+                    <a:lstStyle/>
+                    <a:p>
+                      <a:pPr algn="ctr" latinLnBrk="1"/>
+                      <a:r>
+                        <a:rPr lang="ko-KR" altLang="en-US" sz="2000" dirty="0"/>
+                        <a:t>정확도</a:t>
+                      </a:r>
+                    </a:p>
+                  </a:txBody>
+                  <a:tcPr anchor="ctr"/>
+                </a:tc>
+                <a:tc>
+                  <a:txBody>
+                    <a:bodyPr/>
+                    <a:lstStyle/>
+                    <a:p>
+                      <a:pPr algn="ctr" latinLnBrk="1"/>
+                      <a:r>
+                        <a:rPr lang="ko-KR" altLang="en-US" sz="2000" dirty="0"/>
+                        <a:t>정밀도</a:t>
+                      </a:r>
+                    </a:p>
+                  </a:txBody>
+                  <a:tcPr anchor="ctr"/>
+                </a:tc>
+                <a:tc>
+                  <a:txBody>
+                    <a:bodyPr/>
+                    <a:lstStyle/>
+                    <a:p>
+                      <a:pPr algn="ctr" latinLnBrk="1"/>
+                      <a:r>
+                        <a:rPr lang="ko-KR" altLang="en-US" sz="2000" dirty="0" err="1"/>
+                        <a:t>재현율</a:t>
+                      </a:r>
+                      <a:endParaRPr lang="ko-KR" altLang="en-US" sz="2000" dirty="0"/>
+                    </a:p>
+                  </a:txBody>
+                  <a:tcPr anchor="ctr"/>
+                </a:tc>
+                <a:tc>
+                  <a:txBody>
+                    <a:bodyPr/>
+                    <a:lstStyle/>
+                    <a:p>
+                      <a:pPr algn="ctr" latinLnBrk="1"/>
+                      <a:r>
+                        <a:rPr lang="ko-KR" altLang="en-US" sz="2000" dirty="0"/>
+                        <a:t>자체선정 지표</a:t>
+                      </a:r>
+                      <a:br>
+                        <a:rPr lang="en-US" altLang="ko-KR" sz="2000" dirty="0"/>
+                      </a:br>
+                      <a:r>
+                        <a:rPr lang="en-US" altLang="ko-KR" sz="2000" dirty="0"/>
+                        <a:t>(</a:t>
+                      </a:r>
+                      <a:r>
+                        <a:rPr lang="ko-KR" altLang="en-US" sz="2000" dirty="0"/>
+                        <a:t>정밀도 </a:t>
+                      </a:r>
+                      <a:r>
+                        <a:rPr lang="en-US" altLang="ko-KR" sz="2000" dirty="0"/>
+                        <a:t>+ </a:t>
+                      </a:r>
+                      <a:r>
+                        <a:rPr lang="ko-KR" altLang="en-US" sz="2000" dirty="0" err="1"/>
+                        <a:t>재현율</a:t>
+                      </a:r>
+                      <a:r>
+                        <a:rPr lang="en-US" altLang="ko-KR" sz="2000" dirty="0"/>
+                        <a:t>*0.56)</a:t>
+                      </a:r>
+                      <a:endParaRPr lang="ko-KR" altLang="en-US" sz="2000" dirty="0"/>
+                    </a:p>
+                  </a:txBody>
+                  <a:tcPr anchor="ctr"/>
+                </a:tc>
+                <a:extLst>
+                  <a:ext uri="{0D108BD9-81ED-4DB2-BD59-A6C34878D82A}">
+                    <a16:rowId xmlns:a16="http://schemas.microsoft.com/office/drawing/2014/main" val="1108238592"/>
+                  </a:ext>
+                </a:extLst>
+              </a:tr>
+              <a:tr h="980440">
+                <a:tc>
+                  <a:txBody>
+                    <a:bodyPr/>
+                    <a:lstStyle/>
+                    <a:p>
+                      <a:pPr algn="ctr" latinLnBrk="1"/>
+                      <a:r>
+                        <a:rPr lang="en-US" altLang="ko-KR" sz="3000" dirty="0"/>
+                        <a:t>0.897</a:t>
+                      </a:r>
+                      <a:endParaRPr lang="ko-KR" altLang="en-US" sz="3000" dirty="0"/>
+                    </a:p>
+                  </a:txBody>
+                  <a:tcPr anchor="ctr"/>
+                </a:tc>
+                <a:tc>
+                  <a:txBody>
+                    <a:bodyPr/>
+                    <a:lstStyle/>
+                    <a:p>
+                      <a:pPr algn="ctr" latinLnBrk="1"/>
+                      <a:r>
+                        <a:rPr lang="en-US" altLang="ko-KR" sz="3000" dirty="0"/>
+                        <a:t>0.645</a:t>
+                      </a:r>
+                      <a:endParaRPr lang="ko-KR" altLang="en-US" sz="3000" dirty="0"/>
+                    </a:p>
+                  </a:txBody>
+                  <a:tcPr anchor="ctr"/>
+                </a:tc>
+                <a:tc>
+                  <a:txBody>
+                    <a:bodyPr/>
+                    <a:lstStyle/>
+                    <a:p>
+                      <a:pPr algn="ctr" latinLnBrk="1"/>
+                      <a:r>
+                        <a:rPr lang="en-US" altLang="ko-KR" sz="3000" dirty="0"/>
+                        <a:t>0.196</a:t>
+                      </a:r>
+                      <a:endParaRPr lang="ko-KR" altLang="en-US" sz="3000" dirty="0"/>
+                    </a:p>
+                  </a:txBody>
+                  <a:tcPr anchor="ctr"/>
+                </a:tc>
+                <a:tc>
+                  <a:txBody>
+                    <a:bodyPr/>
+                    <a:lstStyle/>
+                    <a:p>
+                      <a:pPr algn="ctr" latinLnBrk="1"/>
+                      <a:r>
+                        <a:rPr lang="en-US" altLang="ko-KR" sz="3000" dirty="0"/>
+                        <a:t>0.75476</a:t>
+                      </a:r>
+                      <a:endParaRPr lang="ko-KR" altLang="en-US" sz="3000" dirty="0"/>
+                    </a:p>
+                  </a:txBody>
+                  <a:tcPr anchor="ctr"/>
+                </a:tc>
+                <a:extLst>
+                  <a:ext uri="{0D108BD9-81ED-4DB2-BD59-A6C34878D82A}">
+                    <a16:rowId xmlns:a16="http://schemas.microsoft.com/office/drawing/2014/main" val="2383200537"/>
+                  </a:ext>
+                </a:extLst>
+              </a:tr>
+            </a:tbl>
+          </a:graphicData>
+        </a:graphic>
+      </p:graphicFrame>
     </p:spTree>
   </p:cSld>
   <p:clrMapOvr>
@@ -9156,6 +9486,378 @@
 </file>
 
 <file path=ppt/slides/slide21.xml><?xml version="1.0" encoding="utf-8"?>
+<p:sld xmlns:a="http://schemas.openxmlformats.org/drawingml/2006/main" xmlns:r="http://schemas.openxmlformats.org/officeDocument/2006/relationships" xmlns:p="http://schemas.openxmlformats.org/presentationml/2006/main">
+  <p:cSld>
+    <p:spTree>
+      <p:nvGrpSpPr>
+        <p:cNvPr id="1" name=""/>
+        <p:cNvGrpSpPr/>
+        <p:nvPr/>
+      </p:nvGrpSpPr>
+      <p:grpSpPr>
+        <a:xfrm>
+          <a:off x="0" y="0"/>
+          <a:ext cx="0" cy="0"/>
+          <a:chOff x="0" y="0"/>
+          <a:chExt cx="0" cy="0"/>
+        </a:xfrm>
+      </p:grpSpPr>
+      <p:pic>
+        <p:nvPicPr>
+          <p:cNvPr id="2" name="Object 1"/>
+          <p:cNvPicPr>
+            <a:picLocks noChangeAspect="1"/>
+          </p:cNvPicPr>
+          <p:nvPr/>
+        </p:nvPicPr>
+        <p:blipFill>
+          <a:blip r:embed="rId2" cstate="print"/>
+          <a:stretch>
+            <a:fillRect/>
+          </a:stretch>
+        </p:blipFill>
+        <p:spPr>
+          <a:xfrm>
+            <a:off x="5387994" y="961146"/>
+            <a:ext cx="4517378" cy="1316263"/>
+          </a:xfrm>
+          <a:prstGeom prst="rect">
+            <a:avLst/>
+          </a:prstGeom>
+        </p:spPr>
+      </p:pic>
+      <p:pic>
+        <p:nvPicPr>
+          <p:cNvPr id="3" name="Object 2"/>
+          <p:cNvPicPr>
+            <a:picLocks noChangeAspect="1"/>
+          </p:cNvPicPr>
+          <p:nvPr/>
+        </p:nvPicPr>
+        <p:blipFill>
+          <a:blip r:embed="rId3" cstate="print"/>
+          <a:stretch>
+            <a:fillRect/>
+          </a:stretch>
+        </p:blipFill>
+        <p:spPr>
+          <a:xfrm>
+            <a:off x="1878967" y="1467720"/>
+            <a:ext cx="1537931" cy="652359"/>
+          </a:xfrm>
+          <a:prstGeom prst="rect">
+            <a:avLst/>
+          </a:prstGeom>
+        </p:spPr>
+      </p:pic>
+      <p:pic>
+        <p:nvPicPr>
+          <p:cNvPr id="4" name="Object 3"/>
+          <p:cNvPicPr>
+            <a:picLocks noChangeAspect="1"/>
+          </p:cNvPicPr>
+          <p:nvPr/>
+        </p:nvPicPr>
+        <p:blipFill>
+          <a:blip r:embed="rId4" cstate="print"/>
+          <a:stretch>
+            <a:fillRect/>
+          </a:stretch>
+        </p:blipFill>
+        <p:spPr>
+          <a:xfrm>
+            <a:off x="400360" y="619187"/>
+            <a:ext cx="1890489" cy="1828928"/>
+          </a:xfrm>
+          <a:prstGeom prst="rect">
+            <a:avLst/>
+          </a:prstGeom>
+        </p:spPr>
+      </p:pic>
+      <p:grpSp>
+        <p:nvGrpSpPr>
+          <p:cNvPr id="1001" name="그룹 1001"/>
+          <p:cNvGrpSpPr/>
+          <p:nvPr/>
+        </p:nvGrpSpPr>
+        <p:grpSpPr>
+          <a:xfrm>
+            <a:off x="5378219" y="2356674"/>
+            <a:ext cx="12450332" cy="43148"/>
+            <a:chOff x="5378219" y="2356674"/>
+            <a:chExt cx="12450332" cy="43148"/>
+          </a:xfrm>
+        </p:grpSpPr>
+        <p:pic>
+          <p:nvPicPr>
+            <p:cNvPr id="7" name="Object 6"/>
+            <p:cNvPicPr>
+              <a:picLocks noChangeAspect="1"/>
+            </p:cNvPicPr>
+            <p:nvPr/>
+          </p:nvPicPr>
+          <p:blipFill>
+            <a:blip r:embed="rId5" cstate="print"/>
+            <a:stretch>
+              <a:fillRect/>
+            </a:stretch>
+          </p:blipFill>
+          <p:spPr>
+            <a:xfrm>
+              <a:off x="5378219" y="2356674"/>
+              <a:ext cx="12450332" cy="43148"/>
+            </a:xfrm>
+            <a:prstGeom prst="rect">
+              <a:avLst/>
+            </a:prstGeom>
+          </p:spPr>
+        </p:pic>
+      </p:grpSp>
+      <p:grpSp>
+        <p:nvGrpSpPr>
+          <p:cNvPr id="1002" name="그룹 1002"/>
+          <p:cNvGrpSpPr/>
+          <p:nvPr/>
+        </p:nvGrpSpPr>
+        <p:grpSpPr>
+          <a:xfrm>
+            <a:off x="5358343" y="639654"/>
+            <a:ext cx="12520386" cy="313458"/>
+            <a:chOff x="5358343" y="639654"/>
+            <a:chExt cx="12520386" cy="313458"/>
+          </a:xfrm>
+        </p:grpSpPr>
+        <p:pic>
+          <p:nvPicPr>
+            <p:cNvPr id="10" name="Object 9"/>
+            <p:cNvPicPr>
+              <a:picLocks noChangeAspect="1"/>
+            </p:cNvPicPr>
+            <p:nvPr/>
+          </p:nvPicPr>
+          <p:blipFill>
+            <a:blip r:embed="rId6" cstate="print"/>
+            <a:stretch>
+              <a:fillRect/>
+            </a:stretch>
+          </p:blipFill>
+          <p:spPr>
+            <a:xfrm>
+              <a:off x="5358343" y="639654"/>
+              <a:ext cx="12520386" cy="313458"/>
+            </a:xfrm>
+            <a:prstGeom prst="rect">
+              <a:avLst/>
+            </a:prstGeom>
+          </p:spPr>
+        </p:pic>
+      </p:grpSp>
+      <p:grpSp>
+        <p:nvGrpSpPr>
+          <p:cNvPr id="1003" name="그룹 1003"/>
+          <p:cNvGrpSpPr/>
+          <p:nvPr/>
+        </p:nvGrpSpPr>
+        <p:grpSpPr>
+          <a:xfrm>
+            <a:off x="423354" y="2221684"/>
+            <a:ext cx="4407508" cy="313458"/>
+            <a:chOff x="423354" y="2221684"/>
+            <a:chExt cx="4407508" cy="313458"/>
+          </a:xfrm>
+        </p:grpSpPr>
+        <p:pic>
+          <p:nvPicPr>
+            <p:cNvPr id="13" name="Object 12"/>
+            <p:cNvPicPr>
+              <a:picLocks noChangeAspect="1"/>
+            </p:cNvPicPr>
+            <p:nvPr/>
+          </p:nvPicPr>
+          <p:blipFill>
+            <a:blip r:embed="rId7" cstate="print"/>
+            <a:stretch>
+              <a:fillRect/>
+            </a:stretch>
+          </p:blipFill>
+          <p:spPr>
+            <a:xfrm>
+              <a:off x="423354" y="2221684"/>
+              <a:ext cx="4407508" cy="313458"/>
+            </a:xfrm>
+            <a:prstGeom prst="rect">
+              <a:avLst/>
+            </a:prstGeom>
+          </p:spPr>
+        </p:pic>
+      </p:grpSp>
+      <p:pic>
+        <p:nvPicPr>
+          <p:cNvPr id="8" name="그림 7">
+            <a:extLst>
+              <a:ext uri="{FF2B5EF4-FFF2-40B4-BE49-F238E27FC236}">
+                <a16:creationId xmlns:a16="http://schemas.microsoft.com/office/drawing/2014/main" id="{760AD04A-9260-BBC1-67BE-F17A8C66C99E}"/>
+              </a:ext>
+            </a:extLst>
+          </p:cNvPr>
+          <p:cNvPicPr>
+            <a:picLocks noChangeAspect="1"/>
+          </p:cNvPicPr>
+          <p:nvPr/>
+        </p:nvPicPr>
+        <p:blipFill>
+          <a:blip r:embed="rId8">
+            <a:extLst>
+              <a:ext uri="{28A0092B-C50C-407E-A947-70E740481C1C}">
+                <a14:useLocalDpi xmlns:a14="http://schemas.microsoft.com/office/drawing/2010/main" val="0"/>
+              </a:ext>
+            </a:extLst>
+          </a:blip>
+          <a:stretch>
+            <a:fillRect/>
+          </a:stretch>
+        </p:blipFill>
+        <p:spPr>
+          <a:xfrm>
+            <a:off x="1869442" y="2781300"/>
+            <a:ext cx="5022166" cy="3954553"/>
+          </a:xfrm>
+          <a:prstGeom prst="rect">
+            <a:avLst/>
+          </a:prstGeom>
+        </p:spPr>
+      </p:pic>
+      <p:pic>
+        <p:nvPicPr>
+          <p:cNvPr id="11" name="그림 10" descr="테이블이(가) 표시된 사진&#10;&#10;자동 생성된 설명">
+            <a:extLst>
+              <a:ext uri="{FF2B5EF4-FFF2-40B4-BE49-F238E27FC236}">
+                <a16:creationId xmlns:a16="http://schemas.microsoft.com/office/drawing/2014/main" id="{2FD5D736-E748-D2B6-99AE-FDDC00888E9D}"/>
+              </a:ext>
+            </a:extLst>
+          </p:cNvPr>
+          <p:cNvPicPr>
+            <a:picLocks noChangeAspect="1"/>
+          </p:cNvPicPr>
+          <p:nvPr/>
+        </p:nvPicPr>
+        <p:blipFill>
+          <a:blip r:embed="rId9">
+            <a:extLst>
+              <a:ext uri="{28A0092B-C50C-407E-A947-70E740481C1C}">
+                <a14:useLocalDpi xmlns:a14="http://schemas.microsoft.com/office/drawing/2010/main" val="0"/>
+              </a:ext>
+            </a:extLst>
+          </a:blip>
+          <a:stretch>
+            <a:fillRect/>
+          </a:stretch>
+        </p:blipFill>
+        <p:spPr>
+          <a:xfrm>
+            <a:off x="10811426" y="2781300"/>
+            <a:ext cx="5045049" cy="3954552"/>
+          </a:xfrm>
+          <a:prstGeom prst="rect">
+            <a:avLst/>
+          </a:prstGeom>
+        </p:spPr>
+      </p:pic>
+      <p:pic>
+        <p:nvPicPr>
+          <p:cNvPr id="12" name="Object 14">
+            <a:extLst>
+              <a:ext uri="{FF2B5EF4-FFF2-40B4-BE49-F238E27FC236}">
+                <a16:creationId xmlns:a16="http://schemas.microsoft.com/office/drawing/2014/main" id="{5E580648-4AE1-F2DA-C9E2-0B4153B24A57}"/>
+              </a:ext>
+            </a:extLst>
+          </p:cNvPr>
+          <p:cNvPicPr>
+            <a:picLocks noChangeAspect="1"/>
+          </p:cNvPicPr>
+          <p:nvPr/>
+        </p:nvPicPr>
+        <p:blipFill>
+          <a:blip r:embed="rId10" cstate="print"/>
+          <a:stretch>
+            <a:fillRect/>
+          </a:stretch>
+        </p:blipFill>
+        <p:spPr>
+          <a:xfrm>
+            <a:off x="4648200" y="7350650"/>
+            <a:ext cx="11405612" cy="1571784"/>
+          </a:xfrm>
+          <a:prstGeom prst="rect">
+            <a:avLst/>
+          </a:prstGeom>
+        </p:spPr>
+      </p:pic>
+      <p:grpSp>
+        <p:nvGrpSpPr>
+          <p:cNvPr id="14" name="그룹 1005">
+            <a:extLst>
+              <a:ext uri="{FF2B5EF4-FFF2-40B4-BE49-F238E27FC236}">
+                <a16:creationId xmlns:a16="http://schemas.microsoft.com/office/drawing/2014/main" id="{92ADD08F-9089-29F8-6145-69070002FE2F}"/>
+              </a:ext>
+            </a:extLst>
+          </p:cNvPr>
+          <p:cNvGrpSpPr/>
+          <p:nvPr/>
+        </p:nvGrpSpPr>
+        <p:grpSpPr>
+          <a:xfrm>
+            <a:off x="2441117" y="7141142"/>
+            <a:ext cx="2060716" cy="1966902"/>
+            <a:chOff x="1267528" y="6647619"/>
+            <a:chExt cx="2060716" cy="1966902"/>
+          </a:xfrm>
+        </p:grpSpPr>
+        <p:pic>
+          <p:nvPicPr>
+            <p:cNvPr id="16" name="Object 19">
+              <a:extLst>
+                <a:ext uri="{FF2B5EF4-FFF2-40B4-BE49-F238E27FC236}">
+                  <a16:creationId xmlns:a16="http://schemas.microsoft.com/office/drawing/2014/main" id="{EF78B579-129D-B183-1ABB-82C54582EBDA}"/>
+                </a:ext>
+              </a:extLst>
+            </p:cNvPr>
+            <p:cNvPicPr>
+              <a:picLocks noChangeAspect="1"/>
+            </p:cNvPicPr>
+            <p:nvPr/>
+          </p:nvPicPr>
+          <p:blipFill>
+            <a:blip r:embed="rId11" cstate="print"/>
+            <a:stretch>
+              <a:fillRect/>
+            </a:stretch>
+          </p:blipFill>
+          <p:spPr>
+            <a:xfrm>
+              <a:off x="1267528" y="6647619"/>
+              <a:ext cx="2060716" cy="1966902"/>
+            </a:xfrm>
+            <a:prstGeom prst="rect">
+              <a:avLst/>
+            </a:prstGeom>
+          </p:spPr>
+        </p:pic>
+      </p:grpSp>
+    </p:spTree>
+    <p:extLst>
+      <p:ext uri="{BB962C8B-B14F-4D97-AF65-F5344CB8AC3E}">
+        <p14:creationId xmlns:p14="http://schemas.microsoft.com/office/powerpoint/2010/main" val="3437902922"/>
+      </p:ext>
+    </p:extLst>
+  </p:cSld>
+  <p:clrMapOvr>
+    <a:masterClrMapping/>
+  </p:clrMapOvr>
+</p:sld>
+</file>
+
+<file path=ppt/slides/slide22.xml><?xml version="1.0" encoding="utf-8"?>
 <p:sld xmlns:a="http://schemas.openxmlformats.org/drawingml/2006/main" xmlns:r="http://schemas.openxmlformats.org/officeDocument/2006/relationships" xmlns:p="http://schemas.openxmlformats.org/presentationml/2006/main">
   <p:cSld name="Slide 21">
     <p:bg>
@@ -9518,7 +10220,7 @@
             <p:nvPr/>
           </p:nvPicPr>
           <p:blipFill>
-            <a:blip r:embed="rId12" cstate="print"/>
+            <a:blip r:embed="rId10" cstate="print"/>
             <a:stretch>
               <a:fillRect/>
             </a:stretch>
@@ -9543,7 +10245,7 @@
           <p:nvPr/>
         </p:nvPicPr>
         <p:blipFill>
-          <a:blip r:embed="rId13" cstate="print"/>
+          <a:blip r:embed="rId12" cstate="print"/>
           <a:stretch>
             <a:fillRect/>
           </a:stretch>
@@ -9566,7 +10268,7 @@
 </p:sld>
 </file>
 
-<file path=ppt/slides/slide22.xml><?xml version="1.0" encoding="utf-8"?>
+<file path=ppt/slides/slide23.xml><?xml version="1.0" encoding="utf-8"?>
 <p:sld xmlns:a="http://schemas.openxmlformats.org/drawingml/2006/main" xmlns:r="http://schemas.openxmlformats.org/officeDocument/2006/relationships" xmlns:p="http://schemas.openxmlformats.org/presentationml/2006/main">
   <p:cSld name="Slide 22">
     <p:bg>
@@ -9677,7 +10379,7 @@
             <p:nvPr/>
           </p:nvPicPr>
           <p:blipFill>
-            <a:blip r:embed="rId4" cstate="print"/>
+            <a:blip r:embed="rId2" cstate="print"/>
             <a:stretch>
               <a:fillRect/>
             </a:stretch>
@@ -9702,7 +10404,7 @@
           <p:nvPr/>
         </p:nvPicPr>
         <p:blipFill>
-          <a:blip r:embed="rId5" cstate="print"/>
+          <a:blip r:embed="rId4" cstate="print"/>
           <a:stretch>
             <a:fillRect/>
           </a:stretch>
@@ -9726,7 +10428,7 @@
           <p:nvPr/>
         </p:nvPicPr>
         <p:blipFill>
-          <a:blip r:embed="rId6" cstate="print"/>
+          <a:blip r:embed="rId5" cstate="print"/>
           <a:stretch>
             <a:fillRect/>
           </a:stretch>
@@ -9750,7 +10452,7 @@
           <p:nvPr/>
         </p:nvPicPr>
         <p:blipFill>
-          <a:blip r:embed="rId7" cstate="print"/>
+          <a:blip r:embed="rId6" cstate="print"/>
           <a:stretch>
             <a:fillRect/>
           </a:stretch>
@@ -9774,7 +10476,7 @@
           <p:nvPr/>
         </p:nvPicPr>
         <p:blipFill>
-          <a:blip r:embed="rId8" cstate="print"/>
+          <a:blip r:embed="rId7" cstate="print"/>
           <a:stretch>
             <a:fillRect/>
           </a:stretch>
@@ -9797,7 +10499,7 @@
 </p:sld>
 </file>
 
-<file path=ppt/slides/slide23.xml><?xml version="1.0" encoding="utf-8"?>
+<file path=ppt/slides/slide24.xml><?xml version="1.0" encoding="utf-8"?>
 <p:sld xmlns:a="http://schemas.openxmlformats.org/drawingml/2006/main" xmlns:r="http://schemas.openxmlformats.org/officeDocument/2006/relationships" xmlns:p="http://schemas.openxmlformats.org/presentationml/2006/main">
   <p:cSld name="Slide 23">
     <p:bg>
@@ -9932,7 +10634,7 @@
             <p:nvPr/>
           </p:nvPicPr>
           <p:blipFill>
-            <a:blip r:embed="rId5" cstate="print"/>
+            <a:blip r:embed="rId2" cstate="print"/>
             <a:stretch>
               <a:fillRect/>
             </a:stretch>
@@ -9971,7 +10673,7 @@
             <p:nvPr/>
           </p:nvPicPr>
           <p:blipFill>
-            <a:blip r:embed="rId6" cstate="print"/>
+            <a:blip r:embed="rId5" cstate="print"/>
             <a:stretch>
               <a:fillRect/>
             </a:stretch>
@@ -10358,7 +11060,7 @@
             <p:nvPr/>
           </p:nvPicPr>
           <p:blipFill>
-            <a:blip r:embed="rId12" cstate="print"/>
+            <a:blip r:embed="rId8" cstate="print"/>
             <a:stretch>
               <a:fillRect/>
             </a:stretch>
@@ -10383,7 +11085,7 @@
           <p:nvPr/>
         </p:nvPicPr>
         <p:blipFill>
-          <a:blip r:embed="rId13" cstate="print"/>
+          <a:blip r:embed="rId12" cstate="print"/>
           <a:stretch>
             <a:fillRect/>
           </a:stretch>
@@ -10407,7 +11109,7 @@
           <p:nvPr/>
         </p:nvPicPr>
         <p:blipFill>
-          <a:blip r:embed="rId14" cstate="print"/>
+          <a:blip r:embed="rId13" cstate="print"/>
           <a:stretch>
             <a:fillRect/>
           </a:stretch>
@@ -10445,7 +11147,7 @@
             <p:nvPr/>
           </p:nvPicPr>
           <p:blipFill>
-            <a:blip r:embed="rId15" cstate="print"/>
+            <a:blip r:embed="rId11" cstate="print"/>
             <a:stretch>
               <a:fillRect/>
             </a:stretch>
@@ -10484,7 +11186,7 @@
             <p:nvPr/>
           </p:nvPicPr>
           <p:blipFill>
-            <a:blip r:embed="rId16" cstate="print"/>
+            <a:blip r:embed="rId14" cstate="print"/>
             <a:stretch>
               <a:fillRect/>
             </a:stretch>
@@ -10509,7 +11211,7 @@
           <p:nvPr/>
         </p:nvPicPr>
         <p:blipFill>
-          <a:blip r:embed="rId17" cstate="print"/>
+          <a:blip r:embed="rId15" cstate="print"/>
           <a:stretch>
             <a:fillRect/>
           </a:stretch>
@@ -10547,7 +11249,7 @@
             <p:nvPr/>
           </p:nvPicPr>
           <p:blipFill>
-            <a:blip r:embed="rId18" cstate="print"/>
+            <a:blip r:embed="rId11" cstate="print"/>
             <a:stretch>
               <a:fillRect/>
             </a:stretch>
@@ -10586,7 +11288,7 @@
             <p:nvPr/>
           </p:nvPicPr>
           <p:blipFill>
-            <a:blip r:embed="rId19" cstate="print"/>
+            <a:blip r:embed="rId16" cstate="print"/>
             <a:stretch>
               <a:fillRect/>
             </a:stretch>
@@ -10611,7 +11313,7 @@
           <p:nvPr/>
         </p:nvPicPr>
         <p:blipFill>
-          <a:blip r:embed="rId20" cstate="print"/>
+          <a:blip r:embed="rId17" cstate="print"/>
           <a:stretch>
             <a:fillRect/>
           </a:stretch>
@@ -10635,7 +11337,7 @@
           <p:nvPr/>
         </p:nvPicPr>
         <p:blipFill>
-          <a:blip r:embed="rId21" cstate="print"/>
+          <a:blip r:embed="rId18" cstate="print"/>
           <a:stretch>
             <a:fillRect/>
           </a:stretch>
@@ -10673,7 +11375,7 @@
             <p:nvPr/>
           </p:nvPicPr>
           <p:blipFill>
-            <a:blip r:embed="rId22" cstate="print"/>
+            <a:blip r:embed="rId11" cstate="print"/>
             <a:stretch>
               <a:fillRect/>
             </a:stretch>
@@ -10712,7 +11414,7 @@
             <p:nvPr/>
           </p:nvPicPr>
           <p:blipFill>
-            <a:blip r:embed="rId23" cstate="print"/>
+            <a:blip r:embed="rId19" cstate="print"/>
             <a:stretch>
               <a:fillRect/>
             </a:stretch>
@@ -10751,7 +11453,7 @@
             <p:nvPr/>
           </p:nvPicPr>
           <p:blipFill>
-            <a:blip r:embed="rId24" cstate="print"/>
+            <a:blip r:embed="rId20" cstate="print"/>
             <a:stretch>
               <a:fillRect/>
             </a:stretch>
@@ -10790,7 +11492,7 @@
             <p:nvPr/>
           </p:nvPicPr>
           <p:blipFill>
-            <a:blip r:embed="rId25" cstate="print"/>
+            <a:blip r:embed="rId21" cstate="print"/>
             <a:stretch>
               <a:fillRect/>
             </a:stretch>
@@ -10829,7 +11531,7 @@
             <p:nvPr/>
           </p:nvPicPr>
           <p:blipFill>
-            <a:blip r:embed="rId26" cstate="print"/>
+            <a:blip r:embed="rId22" cstate="print"/>
             <a:stretch>
               <a:fillRect/>
             </a:stretch>
@@ -10868,7 +11570,7 @@
             <p:nvPr/>
           </p:nvPicPr>
           <p:blipFill>
-            <a:blip r:embed="rId27" cstate="print"/>
+            <a:blip r:embed="rId23" cstate="print"/>
             <a:stretch>
               <a:fillRect/>
             </a:stretch>
@@ -10907,7 +11609,7 @@
             <p:nvPr/>
           </p:nvPicPr>
           <p:blipFill>
-            <a:blip r:embed="rId28" cstate="print"/>
+            <a:blip r:embed="rId8" cstate="print"/>
             <a:stretch>
               <a:fillRect/>
             </a:stretch>
@@ -10946,7 +11648,7 @@
             <p:nvPr/>
           </p:nvPicPr>
           <p:blipFill>
-            <a:blip r:embed="rId29" cstate="print"/>
+            <a:blip r:embed="rId11" cstate="print"/>
             <a:stretch>
               <a:fillRect/>
             </a:stretch>
@@ -10971,7 +11673,7 @@
           <p:nvPr/>
         </p:nvPicPr>
         <p:blipFill>
-          <a:blip r:embed="rId30" cstate="print"/>
+          <a:blip r:embed="rId24" cstate="print"/>
           <a:stretch>
             <a:fillRect/>
           </a:stretch>
@@ -10995,7 +11697,7 @@
           <p:nvPr/>
         </p:nvPicPr>
         <p:blipFill>
-          <a:blip r:embed="rId31" cstate="print"/>
+          <a:blip r:embed="rId25" cstate="print"/>
           <a:stretch>
             <a:fillRect/>
           </a:stretch>
@@ -11033,7 +11735,7 @@
             <p:nvPr/>
           </p:nvPicPr>
           <p:blipFill>
-            <a:blip r:embed="rId32" cstate="print"/>
+            <a:blip r:embed="rId26" cstate="print"/>
             <a:stretch>
               <a:fillRect/>
             </a:stretch>
@@ -11072,7 +11774,7 @@
             <p:nvPr/>
           </p:nvPicPr>
           <p:blipFill>
-            <a:blip r:embed="rId33" cstate="print"/>
+            <a:blip r:embed="rId27" cstate="print"/>
             <a:stretch>
               <a:fillRect/>
             </a:stretch>
@@ -11111,7 +11813,7 @@
             <p:nvPr/>
           </p:nvPicPr>
           <p:blipFill>
-            <a:blip r:embed="rId34" cstate="print"/>
+            <a:blip r:embed="rId28" cstate="print"/>
             <a:stretch>
               <a:fillRect/>
             </a:stretch>
@@ -11150,7 +11852,7 @@
             <p:nvPr/>
           </p:nvPicPr>
           <p:blipFill>
-            <a:blip r:embed="rId35" cstate="print"/>
+            <a:blip r:embed="rId29" cstate="print"/>
             <a:stretch>
               <a:fillRect/>
             </a:stretch>
@@ -11175,7 +11877,7 @@
           <p:nvPr/>
         </p:nvPicPr>
         <p:blipFill>
-          <a:blip r:embed="rId36" cstate="print"/>
+          <a:blip r:embed="rId30" cstate="print"/>
           <a:stretch>
             <a:fillRect/>
           </a:stretch>
@@ -11199,7 +11901,7 @@
           <p:nvPr/>
         </p:nvPicPr>
         <p:blipFill>
-          <a:blip r:embed="rId37" cstate="print"/>
+          <a:blip r:embed="rId31" cstate="print"/>
           <a:stretch>
             <a:fillRect/>
           </a:stretch>
@@ -11223,7 +11925,7 @@
           <p:nvPr/>
         </p:nvPicPr>
         <p:blipFill>
-          <a:blip r:embed="rId38" cstate="print"/>
+          <a:blip r:embed="rId31" cstate="print"/>
           <a:stretch>
             <a:fillRect/>
           </a:stretch>
@@ -11247,7 +11949,7 @@
           <p:nvPr/>
         </p:nvPicPr>
         <p:blipFill>
-          <a:blip r:embed="rId39" cstate="print"/>
+          <a:blip r:embed="rId31" cstate="print"/>
           <a:stretch>
             <a:fillRect/>
           </a:stretch>
@@ -11271,7 +11973,7 @@
           <p:nvPr/>
         </p:nvPicPr>
         <p:blipFill>
-          <a:blip r:embed="rId40" cstate="print"/>
+          <a:blip r:embed="rId31" cstate="print"/>
           <a:stretch>
             <a:fillRect/>
           </a:stretch>
@@ -11295,7 +11997,7 @@
           <p:nvPr/>
         </p:nvPicPr>
         <p:blipFill>
-          <a:blip r:embed="rId41" cstate="print"/>
+          <a:blip r:embed="rId32" cstate="print"/>
           <a:stretch>
             <a:fillRect/>
           </a:stretch>
@@ -12488,7 +13190,7 @@
             <p:nvPr/>
           </p:nvPicPr>
           <p:blipFill>
-            <a:blip r:embed="rId22" cstate="print"/>
+            <a:blip r:embed="rId21" cstate="print"/>
             <a:stretch>
               <a:fillRect/>
             </a:stretch>
@@ -12513,7 +13215,7 @@
           <p:nvPr/>
         </p:nvPicPr>
         <p:blipFill>
-          <a:blip r:embed="rId23" cstate="print"/>
+          <a:blip r:embed="rId22" cstate="print"/>
           <a:stretch>
             <a:fillRect/>
           </a:stretch>

</xml_diff>